<commit_message>
Microsoft twiddled some bits
</commit_message>
<xml_diff>
--- a/Slides_by_zakf.pptx
+++ b/Slides_by_zakf.pptx
@@ -3356,6 +3356,13 @@
   <p:clrMapOvr>
     <a:masterClrMapping/>
   </p:clrMapOvr>
+  <p:timing>
+    <p:tnLst>
+      <p:par>
+        <p:cTn xmlns:p14="http://schemas.microsoft.com/office/powerpoint/2010/main" id="1" dur="indefinite" restart="never" nodeType="tmRoot"/>
+      </p:par>
+    </p:tnLst>
+  </p:timing>
 </p:sld>
 </file>
 
@@ -3590,6 +3597,13 @@
   <p:clrMapOvr>
     <a:masterClrMapping/>
   </p:clrMapOvr>
+  <p:timing>
+    <p:tnLst>
+      <p:par>
+        <p:cTn xmlns:p14="http://schemas.microsoft.com/office/powerpoint/2010/main" id="1" dur="indefinite" restart="never" nodeType="tmRoot"/>
+      </p:par>
+    </p:tnLst>
+  </p:timing>
 </p:sld>
 </file>
 
@@ -3740,6 +3754,13 @@
   <p:clrMapOvr>
     <a:masterClrMapping/>
   </p:clrMapOvr>
+  <p:timing>
+    <p:tnLst>
+      <p:par>
+        <p:cTn xmlns:p14="http://schemas.microsoft.com/office/powerpoint/2010/main" id="1" dur="indefinite" restart="never" nodeType="tmRoot"/>
+      </p:par>
+    </p:tnLst>
+  </p:timing>
 </p:sld>
 </file>
 
@@ -3967,6 +3988,13 @@
   <p:clrMapOvr>
     <a:masterClrMapping/>
   </p:clrMapOvr>
+  <p:timing>
+    <p:tnLst>
+      <p:par>
+        <p:cTn xmlns:p14="http://schemas.microsoft.com/office/powerpoint/2010/main" id="1" dur="indefinite" restart="never" nodeType="tmRoot"/>
+      </p:par>
+    </p:tnLst>
+  </p:timing>
 </p:sld>
 </file>
 
@@ -4075,6 +4103,13 @@
   <p:clrMapOvr>
     <a:masterClrMapping/>
   </p:clrMapOvr>
+  <p:timing>
+    <p:tnLst>
+      <p:par>
+        <p:cTn xmlns:p14="http://schemas.microsoft.com/office/powerpoint/2010/main" id="1" dur="indefinite" restart="never" nodeType="tmRoot"/>
+      </p:par>
+    </p:tnLst>
+  </p:timing>
 </p:sld>
 </file>
 
@@ -4351,6 +4386,13 @@
   <p:clrMapOvr>
     <a:masterClrMapping/>
   </p:clrMapOvr>
+  <p:timing>
+    <p:tnLst>
+      <p:par>
+        <p:cTn xmlns:p14="http://schemas.microsoft.com/office/powerpoint/2010/main" id="1" dur="indefinite" restart="never" nodeType="tmRoot"/>
+      </p:par>
+    </p:tnLst>
+  </p:timing>
 </p:sld>
 </file>
 

</xml_diff>